<commit_message>
aula 02 de JPA Code First
</commit_message>
<xml_diff>
--- a/Material/POOAula12 - JPA Code First.pptx
+++ b/Material/POOAula12 - JPA Code First.pptx
@@ -39,7 +39,10 @@
     <p:sldId id="265" r:id="rId33"/>
     <p:sldId id="266" r:id="rId34"/>
     <p:sldId id="267" r:id="rId35"/>
-    <p:sldId id="295" r:id="rId36"/>
+    <p:sldId id="296" r:id="rId36"/>
+    <p:sldId id="297" r:id="rId37"/>
+    <p:sldId id="298" r:id="rId38"/>
+    <p:sldId id="295" r:id="rId39"/>
   </p:sldIdLst>
   <p:sldSz cx="12192000" cy="6858000"/>
   <p:notesSz cx="6858000" cy="9144000"/>
@@ -275,7 +278,7 @@
           <a:p>
             <a:fld id="{0D7AE0B8-E3F6-48AC-AF35-D13CD3006A6F}" type="datetimeFigureOut">
               <a:rPr lang="pt-BR" smtClean="0"/>
-              <a:t>15/05/2023</a:t>
+              <a:t>17/05/2023</a:t>
             </a:fld>
             <a:endParaRPr lang="pt-BR"/>
           </a:p>
@@ -443,7 +446,7 @@
           <a:p>
             <a:fld id="{0D7AE0B8-E3F6-48AC-AF35-D13CD3006A6F}" type="datetimeFigureOut">
               <a:rPr lang="pt-BR" smtClean="0"/>
-              <a:t>15/05/2023</a:t>
+              <a:t>17/05/2023</a:t>
             </a:fld>
             <a:endParaRPr lang="pt-BR"/>
           </a:p>
@@ -621,7 +624,7 @@
           <a:p>
             <a:fld id="{0D7AE0B8-E3F6-48AC-AF35-D13CD3006A6F}" type="datetimeFigureOut">
               <a:rPr lang="pt-BR" smtClean="0"/>
-              <a:t>15/05/2023</a:t>
+              <a:t>17/05/2023</a:t>
             </a:fld>
             <a:endParaRPr lang="pt-BR"/>
           </a:p>
@@ -789,7 +792,7 @@
           <a:p>
             <a:fld id="{0D7AE0B8-E3F6-48AC-AF35-D13CD3006A6F}" type="datetimeFigureOut">
               <a:rPr lang="pt-BR" smtClean="0"/>
-              <a:t>15/05/2023</a:t>
+              <a:t>17/05/2023</a:t>
             </a:fld>
             <a:endParaRPr lang="pt-BR"/>
           </a:p>
@@ -1034,7 +1037,7 @@
           <a:p>
             <a:fld id="{0D7AE0B8-E3F6-48AC-AF35-D13CD3006A6F}" type="datetimeFigureOut">
               <a:rPr lang="pt-BR" smtClean="0"/>
-              <a:t>15/05/2023</a:t>
+              <a:t>17/05/2023</a:t>
             </a:fld>
             <a:endParaRPr lang="pt-BR"/>
           </a:p>
@@ -1263,7 +1266,7 @@
           <a:p>
             <a:fld id="{0D7AE0B8-E3F6-48AC-AF35-D13CD3006A6F}" type="datetimeFigureOut">
               <a:rPr lang="pt-BR" smtClean="0"/>
-              <a:t>15/05/2023</a:t>
+              <a:t>17/05/2023</a:t>
             </a:fld>
             <a:endParaRPr lang="pt-BR"/>
           </a:p>
@@ -1627,7 +1630,7 @@
           <a:p>
             <a:fld id="{0D7AE0B8-E3F6-48AC-AF35-D13CD3006A6F}" type="datetimeFigureOut">
               <a:rPr lang="pt-BR" smtClean="0"/>
-              <a:t>15/05/2023</a:t>
+              <a:t>17/05/2023</a:t>
             </a:fld>
             <a:endParaRPr lang="pt-BR"/>
           </a:p>
@@ -1744,7 +1747,7 @@
           <a:p>
             <a:fld id="{0D7AE0B8-E3F6-48AC-AF35-D13CD3006A6F}" type="datetimeFigureOut">
               <a:rPr lang="pt-BR" smtClean="0"/>
-              <a:t>15/05/2023</a:t>
+              <a:t>17/05/2023</a:t>
             </a:fld>
             <a:endParaRPr lang="pt-BR"/>
           </a:p>
@@ -1839,7 +1842,7 @@
           <a:p>
             <a:fld id="{0D7AE0B8-E3F6-48AC-AF35-D13CD3006A6F}" type="datetimeFigureOut">
               <a:rPr lang="pt-BR" smtClean="0"/>
-              <a:t>15/05/2023</a:t>
+              <a:t>17/05/2023</a:t>
             </a:fld>
             <a:endParaRPr lang="pt-BR"/>
           </a:p>
@@ -2114,7 +2117,7 @@
           <a:p>
             <a:fld id="{0D7AE0B8-E3F6-48AC-AF35-D13CD3006A6F}" type="datetimeFigureOut">
               <a:rPr lang="pt-BR" smtClean="0"/>
-              <a:t>15/05/2023</a:t>
+              <a:t>17/05/2023</a:t>
             </a:fld>
             <a:endParaRPr lang="pt-BR"/>
           </a:p>
@@ -2366,7 +2369,7 @@
           <a:p>
             <a:fld id="{0D7AE0B8-E3F6-48AC-AF35-D13CD3006A6F}" type="datetimeFigureOut">
               <a:rPr lang="pt-BR" smtClean="0"/>
-              <a:t>15/05/2023</a:t>
+              <a:t>17/05/2023</a:t>
             </a:fld>
             <a:endParaRPr lang="pt-BR"/>
           </a:p>
@@ -2577,7 +2580,7 @@
           <a:p>
             <a:fld id="{0D7AE0B8-E3F6-48AC-AF35-D13CD3006A6F}" type="datetimeFigureOut">
               <a:rPr lang="pt-BR" smtClean="0"/>
-              <a:t>15/05/2023</a:t>
+              <a:t>17/05/2023</a:t>
             </a:fld>
             <a:endParaRPr lang="pt-BR"/>
           </a:p>
@@ -10050,6 +10053,1014 @@
 </file>
 
 <file path=ppt/slides/slide35.xml><?xml version="1.0" encoding="utf-8"?>
+<p:sld xmlns:a="http://schemas.openxmlformats.org/drawingml/2006/main" xmlns:r="http://schemas.openxmlformats.org/officeDocument/2006/relationships" xmlns:p="http://schemas.openxmlformats.org/presentationml/2006/main">
+  <p:cSld>
+    <p:spTree>
+      <p:nvGrpSpPr>
+        <p:cNvPr id="1" name=""/>
+        <p:cNvGrpSpPr/>
+        <p:nvPr/>
+      </p:nvGrpSpPr>
+      <p:grpSpPr>
+        <a:xfrm>
+          <a:off x="0" y="0"/>
+          <a:ext cx="0" cy="0"/>
+          <a:chOff x="0" y="0"/>
+          <a:chExt cx="0" cy="0"/>
+        </a:xfrm>
+      </p:grpSpPr>
+      <p:sp>
+        <p:nvSpPr>
+          <p:cNvPr id="2" name="Título 1"/>
+          <p:cNvSpPr>
+            <a:spLocks noGrp="1"/>
+          </p:cNvSpPr>
+          <p:nvPr>
+            <p:ph type="title"/>
+          </p:nvPr>
+        </p:nvSpPr>
+        <p:spPr/>
+        <p:txBody>
+          <a:bodyPr/>
+          <a:lstStyle/>
+          <a:p>
+            <a:r>
+              <a:rPr lang="pt-BR" dirty="0" smtClean="0"/>
+              <a:t>Alterando um objeto do banco de dados via JPA</a:t>
+            </a:r>
+            <a:endParaRPr lang="pt-BR" dirty="0"/>
+          </a:p>
+        </p:txBody>
+      </p:sp>
+      <p:sp>
+        <p:nvSpPr>
+          <p:cNvPr id="3" name="Espaço Reservado para Conteúdo 2"/>
+          <p:cNvSpPr>
+            <a:spLocks noGrp="1"/>
+          </p:cNvSpPr>
+          <p:nvPr>
+            <p:ph idx="1"/>
+          </p:nvPr>
+        </p:nvSpPr>
+        <p:spPr/>
+        <p:txBody>
+          <a:bodyPr>
+            <a:normAutofit fontScale="77500" lnSpcReduction="20000"/>
+          </a:bodyPr>
+          <a:lstStyle/>
+          <a:p>
+            <a:pPr marL="0" indent="0">
+              <a:buNone/>
+            </a:pPr>
+            <a:r>
+              <a:rPr lang="pt-BR" dirty="0" smtClean="0"/>
+              <a:t>        </a:t>
+            </a:r>
+            <a:r>
+              <a:rPr lang="pt-BR" dirty="0" err="1" smtClean="0"/>
+              <a:t>EntityManagerFactory</a:t>
+            </a:r>
+            <a:r>
+              <a:rPr lang="pt-BR" dirty="0" smtClean="0"/>
+              <a:t> </a:t>
+            </a:r>
+            <a:r>
+              <a:rPr lang="pt-BR" dirty="0" err="1"/>
+              <a:t>emf</a:t>
+            </a:r>
+            <a:r>
+              <a:rPr lang="pt-BR" dirty="0"/>
+              <a:t> = </a:t>
+            </a:r>
+            <a:r>
+              <a:rPr lang="pt-BR" dirty="0" err="1"/>
+              <a:t>Persistence.createEntityManagerFactory</a:t>
+            </a:r>
+            <a:r>
+              <a:rPr lang="pt-BR" dirty="0"/>
+              <a:t>("</a:t>
+            </a:r>
+            <a:r>
+              <a:rPr lang="pt-BR" dirty="0" err="1"/>
+              <a:t>jpa</a:t>
+            </a:r>
+            <a:r>
+              <a:rPr lang="pt-BR" dirty="0"/>
+              <a:t>");</a:t>
+            </a:r>
+          </a:p>
+          <a:p>
+            <a:pPr marL="0" indent="0">
+              <a:buNone/>
+            </a:pPr>
+            <a:r>
+              <a:rPr lang="pt-BR" dirty="0"/>
+              <a:t>        </a:t>
+            </a:r>
+            <a:r>
+              <a:rPr lang="pt-BR" dirty="0" err="1"/>
+              <a:t>EntityManager</a:t>
+            </a:r>
+            <a:r>
+              <a:rPr lang="pt-BR" dirty="0"/>
+              <a:t> em = </a:t>
+            </a:r>
+            <a:r>
+              <a:rPr lang="pt-BR" dirty="0" err="1"/>
+              <a:t>emf.createEntityManager</a:t>
+            </a:r>
+            <a:r>
+              <a:rPr lang="pt-BR" dirty="0"/>
+              <a:t>();       </a:t>
+            </a:r>
+            <a:endParaRPr lang="pt-BR" dirty="0" smtClean="0"/>
+          </a:p>
+          <a:p>
+            <a:pPr marL="0" indent="0">
+              <a:buNone/>
+            </a:pPr>
+            <a:r>
+              <a:rPr lang="pt-BR" dirty="0" smtClean="0"/>
+              <a:t>        //</a:t>
+            </a:r>
+            <a:r>
+              <a:rPr lang="pt-BR" dirty="0"/>
+              <a:t>consulta um usuário por id</a:t>
+            </a:r>
+          </a:p>
+          <a:p>
+            <a:pPr marL="0" indent="0">
+              <a:buNone/>
+            </a:pPr>
+            <a:r>
+              <a:rPr lang="pt-BR" dirty="0"/>
+              <a:t>        </a:t>
+            </a:r>
+            <a:r>
+              <a:rPr lang="pt-BR" dirty="0" err="1"/>
+              <a:t>Usuario</a:t>
+            </a:r>
+            <a:r>
+              <a:rPr lang="pt-BR" dirty="0"/>
+              <a:t> u = </a:t>
+            </a:r>
+            <a:r>
+              <a:rPr lang="pt-BR" dirty="0" err="1"/>
+              <a:t>em.find</a:t>
+            </a:r>
+            <a:r>
+              <a:rPr lang="pt-BR" dirty="0"/>
+              <a:t>(</a:t>
+            </a:r>
+            <a:r>
+              <a:rPr lang="pt-BR" dirty="0" err="1"/>
+              <a:t>Usuario.class</a:t>
+            </a:r>
+            <a:r>
+              <a:rPr lang="pt-BR" dirty="0"/>
+              <a:t>, 1);</a:t>
+            </a:r>
+          </a:p>
+          <a:p>
+            <a:pPr marL="0" indent="0">
+              <a:buNone/>
+            </a:pPr>
+            <a:r>
+              <a:rPr lang="pt-BR" dirty="0"/>
+              <a:t>        //alterar o objeto</a:t>
+            </a:r>
+          </a:p>
+          <a:p>
+            <a:pPr marL="0" indent="0">
+              <a:buNone/>
+            </a:pPr>
+            <a:r>
+              <a:rPr lang="pt-BR" dirty="0"/>
+              <a:t>        </a:t>
+            </a:r>
+            <a:r>
+              <a:rPr lang="pt-BR" dirty="0" err="1"/>
+              <a:t>u.setNome</a:t>
+            </a:r>
+            <a:r>
+              <a:rPr lang="pt-BR" dirty="0"/>
+              <a:t>("Renata Cristina");</a:t>
+            </a:r>
+          </a:p>
+          <a:p>
+            <a:pPr marL="0" indent="0">
+              <a:buNone/>
+            </a:pPr>
+            <a:r>
+              <a:rPr lang="pt-BR" dirty="0"/>
+              <a:t>        </a:t>
+            </a:r>
+            <a:r>
+              <a:rPr lang="pt-BR" dirty="0" err="1"/>
+              <a:t>em.getTransaction</a:t>
+            </a:r>
+            <a:r>
+              <a:rPr lang="pt-BR" dirty="0"/>
+              <a:t>().</a:t>
+            </a:r>
+            <a:r>
+              <a:rPr lang="pt-BR" dirty="0" err="1"/>
+              <a:t>begin</a:t>
+            </a:r>
+            <a:r>
+              <a:rPr lang="pt-BR" dirty="0"/>
+              <a:t>();</a:t>
+            </a:r>
+          </a:p>
+          <a:p>
+            <a:pPr marL="0" indent="0">
+              <a:buNone/>
+            </a:pPr>
+            <a:r>
+              <a:rPr lang="pt-BR" dirty="0"/>
+              <a:t>        //alterar o banco de dados</a:t>
+            </a:r>
+          </a:p>
+          <a:p>
+            <a:pPr marL="0" indent="0">
+              <a:buNone/>
+            </a:pPr>
+            <a:r>
+              <a:rPr lang="pt-BR" dirty="0"/>
+              <a:t>        </a:t>
+            </a:r>
+            <a:r>
+              <a:rPr lang="pt-BR" dirty="0" err="1"/>
+              <a:t>em.merge</a:t>
+            </a:r>
+            <a:r>
+              <a:rPr lang="pt-BR" dirty="0"/>
+              <a:t>(u);</a:t>
+            </a:r>
+          </a:p>
+          <a:p>
+            <a:pPr marL="0" indent="0">
+              <a:buNone/>
+            </a:pPr>
+            <a:r>
+              <a:rPr lang="pt-BR" dirty="0"/>
+              <a:t>        </a:t>
+            </a:r>
+            <a:r>
+              <a:rPr lang="pt-BR" dirty="0" err="1"/>
+              <a:t>em.getTransaction</a:t>
+            </a:r>
+            <a:r>
+              <a:rPr lang="pt-BR" dirty="0"/>
+              <a:t>().</a:t>
+            </a:r>
+            <a:r>
+              <a:rPr lang="pt-BR" dirty="0" err="1"/>
+              <a:t>commit</a:t>
+            </a:r>
+            <a:r>
+              <a:rPr lang="pt-BR" dirty="0" smtClean="0"/>
+              <a:t>();</a:t>
+            </a:r>
+          </a:p>
+          <a:p>
+            <a:pPr marL="0" indent="0">
+              <a:buNone/>
+            </a:pPr>
+            <a:r>
+              <a:rPr lang="pt-BR" dirty="0" smtClean="0"/>
+              <a:t>        </a:t>
+            </a:r>
+            <a:r>
+              <a:rPr lang="pt-BR" dirty="0" err="1" smtClean="0"/>
+              <a:t>em.close</a:t>
+            </a:r>
+            <a:r>
+              <a:rPr lang="pt-BR" dirty="0"/>
+              <a:t>();</a:t>
+            </a:r>
+          </a:p>
+          <a:p>
+            <a:pPr marL="0" indent="0">
+              <a:buNone/>
+            </a:pPr>
+            <a:r>
+              <a:rPr lang="pt-BR" dirty="0"/>
+              <a:t>        </a:t>
+            </a:r>
+            <a:r>
+              <a:rPr lang="pt-BR" dirty="0" err="1"/>
+              <a:t>emf.close</a:t>
+            </a:r>
+            <a:r>
+              <a:rPr lang="pt-BR" dirty="0"/>
+              <a:t>();</a:t>
+            </a:r>
+          </a:p>
+        </p:txBody>
+      </p:sp>
+    </p:spTree>
+    <p:extLst>
+      <p:ext uri="{BB962C8B-B14F-4D97-AF65-F5344CB8AC3E}">
+        <p14:creationId xmlns:p14="http://schemas.microsoft.com/office/powerpoint/2010/main" val="4063837374"/>
+      </p:ext>
+    </p:extLst>
+  </p:cSld>
+  <p:clrMapOvr>
+    <a:masterClrMapping/>
+  </p:clrMapOvr>
+</p:sld>
+</file>
+
+<file path=ppt/slides/slide36.xml><?xml version="1.0" encoding="utf-8"?>
+<p:sld xmlns:a="http://schemas.openxmlformats.org/drawingml/2006/main" xmlns:r="http://schemas.openxmlformats.org/officeDocument/2006/relationships" xmlns:p="http://schemas.openxmlformats.org/presentationml/2006/main">
+  <p:cSld>
+    <p:spTree>
+      <p:nvGrpSpPr>
+        <p:cNvPr id="1" name=""/>
+        <p:cNvGrpSpPr/>
+        <p:nvPr/>
+      </p:nvGrpSpPr>
+      <p:grpSpPr>
+        <a:xfrm>
+          <a:off x="0" y="0"/>
+          <a:ext cx="0" cy="0"/>
+          <a:chOff x="0" y="0"/>
+          <a:chExt cx="0" cy="0"/>
+        </a:xfrm>
+      </p:grpSpPr>
+      <p:sp>
+        <p:nvSpPr>
+          <p:cNvPr id="2" name="Título 1"/>
+          <p:cNvSpPr>
+            <a:spLocks noGrp="1"/>
+          </p:cNvSpPr>
+          <p:nvPr>
+            <p:ph type="title"/>
+          </p:nvPr>
+        </p:nvSpPr>
+        <p:spPr/>
+        <p:txBody>
+          <a:bodyPr/>
+          <a:lstStyle/>
+          <a:p>
+            <a:r>
+              <a:rPr lang="pt-BR" dirty="0" smtClean="0"/>
+              <a:t>Excluir um usuário via JPA</a:t>
+            </a:r>
+            <a:endParaRPr lang="pt-BR" dirty="0"/>
+          </a:p>
+        </p:txBody>
+      </p:sp>
+      <p:sp>
+        <p:nvSpPr>
+          <p:cNvPr id="3" name="Espaço Reservado para Conteúdo 2"/>
+          <p:cNvSpPr>
+            <a:spLocks noGrp="1"/>
+          </p:cNvSpPr>
+          <p:nvPr>
+            <p:ph idx="1"/>
+          </p:nvPr>
+        </p:nvSpPr>
+        <p:spPr/>
+        <p:txBody>
+          <a:bodyPr>
+            <a:normAutofit fontScale="92500" lnSpcReduction="20000"/>
+          </a:bodyPr>
+          <a:lstStyle/>
+          <a:p>
+            <a:pPr marL="0" indent="0">
+              <a:buNone/>
+            </a:pPr>
+            <a:r>
+              <a:rPr lang="pt-BR" dirty="0" smtClean="0"/>
+              <a:t>        </a:t>
+            </a:r>
+            <a:r>
+              <a:rPr lang="pt-BR" dirty="0" err="1" smtClean="0"/>
+              <a:t>EntityManagerFactory</a:t>
+            </a:r>
+            <a:r>
+              <a:rPr lang="pt-BR" dirty="0" smtClean="0"/>
+              <a:t> </a:t>
+            </a:r>
+            <a:r>
+              <a:rPr lang="pt-BR" dirty="0" err="1"/>
+              <a:t>emf</a:t>
+            </a:r>
+            <a:r>
+              <a:rPr lang="pt-BR" dirty="0"/>
+              <a:t> = </a:t>
+            </a:r>
+            <a:r>
+              <a:rPr lang="pt-BR" dirty="0" err="1"/>
+              <a:t>Persistence.createEntityManagerFactory</a:t>
+            </a:r>
+            <a:r>
+              <a:rPr lang="pt-BR" dirty="0"/>
+              <a:t>("</a:t>
+            </a:r>
+            <a:r>
+              <a:rPr lang="pt-BR" dirty="0" err="1"/>
+              <a:t>jpa</a:t>
+            </a:r>
+            <a:r>
+              <a:rPr lang="pt-BR" dirty="0"/>
+              <a:t>");</a:t>
+            </a:r>
+          </a:p>
+          <a:p>
+            <a:pPr marL="0" indent="0">
+              <a:buNone/>
+            </a:pPr>
+            <a:r>
+              <a:rPr lang="pt-BR" dirty="0"/>
+              <a:t>        </a:t>
+            </a:r>
+            <a:r>
+              <a:rPr lang="pt-BR" dirty="0" err="1"/>
+              <a:t>EntityManager</a:t>
+            </a:r>
+            <a:r>
+              <a:rPr lang="pt-BR" dirty="0"/>
+              <a:t> em = </a:t>
+            </a:r>
+            <a:r>
+              <a:rPr lang="pt-BR" dirty="0" err="1"/>
+              <a:t>emf.createEntityManager</a:t>
+            </a:r>
+            <a:r>
+              <a:rPr lang="pt-BR" dirty="0"/>
+              <a:t>();       </a:t>
+            </a:r>
+          </a:p>
+          <a:p>
+            <a:pPr marL="0" indent="0">
+              <a:buNone/>
+            </a:pPr>
+            <a:endParaRPr lang="pt-BR" dirty="0" smtClean="0"/>
+          </a:p>
+          <a:p>
+            <a:pPr marL="0" indent="0">
+              <a:buNone/>
+            </a:pPr>
+            <a:r>
+              <a:rPr lang="pt-BR" dirty="0" smtClean="0"/>
+              <a:t>       //</a:t>
+            </a:r>
+            <a:r>
+              <a:rPr lang="pt-BR" dirty="0"/>
+              <a:t>excluir usuário</a:t>
+            </a:r>
+          </a:p>
+          <a:p>
+            <a:pPr marL="0" indent="0">
+              <a:buNone/>
+            </a:pPr>
+            <a:r>
+              <a:rPr lang="pt-BR" dirty="0"/>
+              <a:t>        </a:t>
+            </a:r>
+            <a:r>
+              <a:rPr lang="pt-BR" dirty="0" err="1"/>
+              <a:t>Usuario</a:t>
+            </a:r>
+            <a:r>
+              <a:rPr lang="pt-BR" dirty="0"/>
+              <a:t> us2 = </a:t>
+            </a:r>
+            <a:r>
+              <a:rPr lang="pt-BR" dirty="0" err="1"/>
+              <a:t>em.find</a:t>
+            </a:r>
+            <a:r>
+              <a:rPr lang="pt-BR" dirty="0"/>
+              <a:t>(</a:t>
+            </a:r>
+            <a:r>
+              <a:rPr lang="pt-BR" dirty="0" err="1"/>
+              <a:t>Usuario.class</a:t>
+            </a:r>
+            <a:r>
+              <a:rPr lang="pt-BR" dirty="0"/>
+              <a:t>, 3);</a:t>
+            </a:r>
+          </a:p>
+          <a:p>
+            <a:pPr marL="0" indent="0">
+              <a:buNone/>
+            </a:pPr>
+            <a:r>
+              <a:rPr lang="pt-BR" dirty="0"/>
+              <a:t>        </a:t>
+            </a:r>
+            <a:r>
+              <a:rPr lang="pt-BR" dirty="0" err="1"/>
+              <a:t>em.getTransaction</a:t>
+            </a:r>
+            <a:r>
+              <a:rPr lang="pt-BR" dirty="0"/>
+              <a:t>().</a:t>
+            </a:r>
+            <a:r>
+              <a:rPr lang="pt-BR" dirty="0" err="1"/>
+              <a:t>begin</a:t>
+            </a:r>
+            <a:r>
+              <a:rPr lang="pt-BR" dirty="0"/>
+              <a:t>();</a:t>
+            </a:r>
+          </a:p>
+          <a:p>
+            <a:pPr marL="0" indent="0">
+              <a:buNone/>
+            </a:pPr>
+            <a:r>
+              <a:rPr lang="pt-BR" dirty="0"/>
+              <a:t>        </a:t>
+            </a:r>
+            <a:r>
+              <a:rPr lang="pt-BR" dirty="0" err="1"/>
+              <a:t>em.remove</a:t>
+            </a:r>
+            <a:r>
+              <a:rPr lang="pt-BR" dirty="0"/>
+              <a:t>(us2);</a:t>
+            </a:r>
+          </a:p>
+          <a:p>
+            <a:pPr marL="0" indent="0">
+              <a:buNone/>
+            </a:pPr>
+            <a:r>
+              <a:rPr lang="pt-BR" dirty="0"/>
+              <a:t>        </a:t>
+            </a:r>
+            <a:r>
+              <a:rPr lang="pt-BR" dirty="0" err="1"/>
+              <a:t>em.getTransaction</a:t>
+            </a:r>
+            <a:r>
+              <a:rPr lang="pt-BR" dirty="0"/>
+              <a:t>().</a:t>
+            </a:r>
+            <a:r>
+              <a:rPr lang="pt-BR" dirty="0" err="1"/>
+              <a:t>commit</a:t>
+            </a:r>
+            <a:r>
+              <a:rPr lang="pt-BR" dirty="0" smtClean="0"/>
+              <a:t>();</a:t>
+            </a:r>
+          </a:p>
+          <a:p>
+            <a:pPr marL="0" indent="0">
+              <a:buNone/>
+            </a:pPr>
+            <a:r>
+              <a:rPr lang="pt-BR" dirty="0" smtClean="0"/>
+              <a:t>        </a:t>
+            </a:r>
+            <a:r>
+              <a:rPr lang="pt-BR" dirty="0" err="1" smtClean="0"/>
+              <a:t>em.close</a:t>
+            </a:r>
+            <a:r>
+              <a:rPr lang="pt-BR" dirty="0"/>
+              <a:t>();</a:t>
+            </a:r>
+          </a:p>
+          <a:p>
+            <a:pPr marL="0" indent="0">
+              <a:buNone/>
+            </a:pPr>
+            <a:r>
+              <a:rPr lang="pt-BR" dirty="0"/>
+              <a:t>        </a:t>
+            </a:r>
+            <a:r>
+              <a:rPr lang="pt-BR" dirty="0" err="1"/>
+              <a:t>emf.close</a:t>
+            </a:r>
+            <a:r>
+              <a:rPr lang="pt-BR" dirty="0"/>
+              <a:t>();</a:t>
+            </a:r>
+          </a:p>
+          <a:p>
+            <a:pPr marL="0" indent="0">
+              <a:buNone/>
+            </a:pPr>
+            <a:endParaRPr lang="pt-BR" dirty="0"/>
+          </a:p>
+        </p:txBody>
+      </p:sp>
+    </p:spTree>
+    <p:extLst>
+      <p:ext uri="{BB962C8B-B14F-4D97-AF65-F5344CB8AC3E}">
+        <p14:creationId xmlns:p14="http://schemas.microsoft.com/office/powerpoint/2010/main" val="800317142"/>
+      </p:ext>
+    </p:extLst>
+  </p:cSld>
+  <p:clrMapOvr>
+    <a:masterClrMapping/>
+  </p:clrMapOvr>
+</p:sld>
+</file>
+
+<file path=ppt/slides/slide37.xml><?xml version="1.0" encoding="utf-8"?>
+<p:sld xmlns:a="http://schemas.openxmlformats.org/drawingml/2006/main" xmlns:r="http://schemas.openxmlformats.org/officeDocument/2006/relationships" xmlns:p="http://schemas.openxmlformats.org/presentationml/2006/main">
+  <p:cSld>
+    <p:spTree>
+      <p:nvGrpSpPr>
+        <p:cNvPr id="1" name=""/>
+        <p:cNvGrpSpPr/>
+        <p:nvPr/>
+      </p:nvGrpSpPr>
+      <p:grpSpPr>
+        <a:xfrm>
+          <a:off x="0" y="0"/>
+          <a:ext cx="0" cy="0"/>
+          <a:chOff x="0" y="0"/>
+          <a:chExt cx="0" cy="0"/>
+        </a:xfrm>
+      </p:grpSpPr>
+      <p:sp>
+        <p:nvSpPr>
+          <p:cNvPr id="2" name="Título 1"/>
+          <p:cNvSpPr>
+            <a:spLocks noGrp="1"/>
+          </p:cNvSpPr>
+          <p:nvPr>
+            <p:ph type="title"/>
+          </p:nvPr>
+        </p:nvSpPr>
+        <p:spPr/>
+        <p:txBody>
+          <a:bodyPr/>
+          <a:lstStyle/>
+          <a:p>
+            <a:r>
+              <a:rPr lang="pt-BR" dirty="0" smtClean="0"/>
+              <a:t>Realizar um consulta via JPA</a:t>
+            </a:r>
+            <a:endParaRPr lang="pt-BR" dirty="0"/>
+          </a:p>
+        </p:txBody>
+      </p:sp>
+      <p:sp>
+        <p:nvSpPr>
+          <p:cNvPr id="3" name="Espaço Reservado para Conteúdo 2"/>
+          <p:cNvSpPr>
+            <a:spLocks noGrp="1"/>
+          </p:cNvSpPr>
+          <p:nvPr>
+            <p:ph idx="1"/>
+          </p:nvPr>
+        </p:nvSpPr>
+        <p:spPr/>
+        <p:txBody>
+          <a:bodyPr>
+            <a:normAutofit fontScale="62500" lnSpcReduction="20000"/>
+          </a:bodyPr>
+          <a:lstStyle/>
+          <a:p>
+            <a:pPr marL="0" indent="0">
+              <a:buNone/>
+            </a:pPr>
+            <a:r>
+              <a:rPr lang="pt-BR" dirty="0" smtClean="0"/>
+              <a:t>        </a:t>
+            </a:r>
+            <a:r>
+              <a:rPr lang="pt-BR" dirty="0" err="1" smtClean="0"/>
+              <a:t>EntityManagerFactory</a:t>
+            </a:r>
+            <a:r>
+              <a:rPr lang="pt-BR" dirty="0" smtClean="0"/>
+              <a:t> </a:t>
+            </a:r>
+            <a:r>
+              <a:rPr lang="pt-BR" dirty="0" err="1"/>
+              <a:t>emf</a:t>
+            </a:r>
+            <a:r>
+              <a:rPr lang="pt-BR" dirty="0"/>
+              <a:t> = </a:t>
+            </a:r>
+            <a:r>
+              <a:rPr lang="pt-BR" dirty="0" err="1"/>
+              <a:t>Persistence.createEntityManagerFactory</a:t>
+            </a:r>
+            <a:r>
+              <a:rPr lang="pt-BR" dirty="0"/>
+              <a:t>("</a:t>
+            </a:r>
+            <a:r>
+              <a:rPr lang="pt-BR" dirty="0" err="1"/>
+              <a:t>jpa</a:t>
+            </a:r>
+            <a:r>
+              <a:rPr lang="pt-BR" dirty="0"/>
+              <a:t>");</a:t>
+            </a:r>
+          </a:p>
+          <a:p>
+            <a:pPr marL="0" indent="0">
+              <a:buNone/>
+            </a:pPr>
+            <a:r>
+              <a:rPr lang="pt-BR" dirty="0"/>
+              <a:t>        </a:t>
+            </a:r>
+            <a:r>
+              <a:rPr lang="pt-BR" dirty="0" err="1"/>
+              <a:t>EntityManager</a:t>
+            </a:r>
+            <a:r>
+              <a:rPr lang="pt-BR" dirty="0"/>
+              <a:t> em = </a:t>
+            </a:r>
+            <a:r>
+              <a:rPr lang="pt-BR" dirty="0" err="1"/>
+              <a:t>emf.createEntityManager</a:t>
+            </a:r>
+            <a:r>
+              <a:rPr lang="pt-BR" dirty="0"/>
+              <a:t>();</a:t>
+            </a:r>
+          </a:p>
+          <a:p>
+            <a:pPr marL="0" indent="0">
+              <a:buNone/>
+            </a:pPr>
+            <a:r>
+              <a:rPr lang="pt-BR" smtClean="0"/>
+              <a:t>        String </a:t>
+            </a:r>
+            <a:r>
+              <a:rPr lang="pt-BR" dirty="0" err="1"/>
+              <a:t>nomePesquisado</a:t>
+            </a:r>
+            <a:r>
+              <a:rPr lang="pt-BR" dirty="0"/>
+              <a:t> = "Re";</a:t>
+            </a:r>
+          </a:p>
+          <a:p>
+            <a:pPr marL="0" indent="0">
+              <a:buNone/>
+            </a:pPr>
+            <a:r>
+              <a:rPr lang="pt-BR" dirty="0"/>
+              <a:t>        String </a:t>
+            </a:r>
+            <a:r>
+              <a:rPr lang="pt-BR" dirty="0" err="1"/>
+              <a:t>jpql</a:t>
+            </a:r>
+            <a:r>
+              <a:rPr lang="pt-BR" dirty="0"/>
+              <a:t> = "SELECT u FROM </a:t>
+            </a:r>
+            <a:r>
+              <a:rPr lang="pt-BR" dirty="0" err="1"/>
+              <a:t>Usuario</a:t>
+            </a:r>
+            <a:r>
+              <a:rPr lang="pt-BR" dirty="0"/>
+              <a:t> u WHERE </a:t>
+            </a:r>
+            <a:r>
+              <a:rPr lang="pt-BR" dirty="0" err="1"/>
+              <a:t>u.nome</a:t>
+            </a:r>
+            <a:r>
+              <a:rPr lang="pt-BR" dirty="0"/>
+              <a:t> LIKE :nome";</a:t>
+            </a:r>
+          </a:p>
+          <a:p>
+            <a:pPr marL="0" indent="0">
+              <a:buNone/>
+            </a:pPr>
+            <a:r>
+              <a:rPr lang="pt-BR" dirty="0"/>
+              <a:t>        Query </a:t>
+            </a:r>
+            <a:r>
+              <a:rPr lang="pt-BR" dirty="0" err="1"/>
+              <a:t>query</a:t>
+            </a:r>
+            <a:r>
+              <a:rPr lang="pt-BR" dirty="0"/>
+              <a:t> = </a:t>
+            </a:r>
+            <a:r>
+              <a:rPr lang="pt-BR" dirty="0" err="1"/>
+              <a:t>em.createQuery</a:t>
+            </a:r>
+            <a:r>
+              <a:rPr lang="pt-BR" dirty="0"/>
+              <a:t>(</a:t>
+            </a:r>
+            <a:r>
+              <a:rPr lang="pt-BR" dirty="0" err="1"/>
+              <a:t>jpql</a:t>
+            </a:r>
+            <a:r>
+              <a:rPr lang="pt-BR" dirty="0"/>
+              <a:t>);</a:t>
+            </a:r>
+          </a:p>
+          <a:p>
+            <a:pPr marL="0" indent="0">
+              <a:buNone/>
+            </a:pPr>
+            <a:r>
+              <a:rPr lang="pt-BR" dirty="0"/>
+              <a:t>        </a:t>
+            </a:r>
+            <a:r>
+              <a:rPr lang="pt-BR" dirty="0" err="1"/>
+              <a:t>query.setParameter</a:t>
+            </a:r>
+            <a:r>
+              <a:rPr lang="pt-BR" dirty="0"/>
+              <a:t>("nome", "%" + </a:t>
+            </a:r>
+            <a:r>
+              <a:rPr lang="pt-BR" dirty="0" err="1"/>
+              <a:t>nomePesquisado</a:t>
+            </a:r>
+            <a:r>
+              <a:rPr lang="pt-BR" dirty="0"/>
+              <a:t> + "%");</a:t>
+            </a:r>
+          </a:p>
+          <a:p>
+            <a:pPr marL="0" indent="0">
+              <a:buNone/>
+            </a:pPr>
+            <a:r>
+              <a:rPr lang="pt-BR" dirty="0"/>
+              <a:t>        </a:t>
+            </a:r>
+            <a:r>
+              <a:rPr lang="pt-BR" dirty="0" err="1"/>
+              <a:t>List</a:t>
+            </a:r>
+            <a:r>
+              <a:rPr lang="pt-BR" dirty="0"/>
+              <a:t>&lt;</a:t>
+            </a:r>
+            <a:r>
+              <a:rPr lang="pt-BR" dirty="0" err="1"/>
+              <a:t>Usuario</a:t>
+            </a:r>
+            <a:r>
+              <a:rPr lang="pt-BR" dirty="0"/>
+              <a:t>&gt; usuarios = </a:t>
+            </a:r>
+            <a:r>
+              <a:rPr lang="pt-BR" dirty="0" err="1"/>
+              <a:t>query.getResultList</a:t>
+            </a:r>
+            <a:r>
+              <a:rPr lang="pt-BR" dirty="0"/>
+              <a:t>();</a:t>
+            </a:r>
+          </a:p>
+          <a:p>
+            <a:pPr marL="0" indent="0">
+              <a:buNone/>
+            </a:pPr>
+            <a:r>
+              <a:rPr lang="pt-BR" dirty="0"/>
+              <a:t>        for (</a:t>
+            </a:r>
+            <a:r>
+              <a:rPr lang="pt-BR" dirty="0" err="1"/>
+              <a:t>Usuario</a:t>
+            </a:r>
+            <a:r>
+              <a:rPr lang="pt-BR" dirty="0"/>
+              <a:t> </a:t>
+            </a:r>
+            <a:r>
+              <a:rPr lang="pt-BR" dirty="0" err="1"/>
+              <a:t>usuario</a:t>
+            </a:r>
+            <a:r>
+              <a:rPr lang="pt-BR" dirty="0"/>
+              <a:t> : usuarios) {</a:t>
+            </a:r>
+          </a:p>
+          <a:p>
+            <a:pPr marL="0" indent="0">
+              <a:buNone/>
+            </a:pPr>
+            <a:r>
+              <a:rPr lang="pt-BR" dirty="0"/>
+              <a:t>            </a:t>
+            </a:r>
+            <a:r>
+              <a:rPr lang="pt-BR" dirty="0" err="1"/>
+              <a:t>System.out.println</a:t>
+            </a:r>
+            <a:r>
+              <a:rPr lang="pt-BR" dirty="0"/>
+              <a:t>("Id " + </a:t>
+            </a:r>
+            <a:r>
+              <a:rPr lang="pt-BR" dirty="0" err="1"/>
+              <a:t>usuario.getId</a:t>
+            </a:r>
+            <a:r>
+              <a:rPr lang="pt-BR" dirty="0"/>
+              <a:t>() + " | Nome: "</a:t>
+            </a:r>
+          </a:p>
+          <a:p>
+            <a:pPr marL="0" indent="0">
+              <a:buNone/>
+            </a:pPr>
+            <a:r>
+              <a:rPr lang="pt-BR" dirty="0"/>
+              <a:t>                    + </a:t>
+            </a:r>
+            <a:r>
+              <a:rPr lang="pt-BR" dirty="0" err="1"/>
+              <a:t>usuario.getNome</a:t>
+            </a:r>
+            <a:r>
+              <a:rPr lang="pt-BR" dirty="0"/>
+              <a:t>());</a:t>
+            </a:r>
+          </a:p>
+          <a:p>
+            <a:pPr marL="0" indent="0">
+              <a:buNone/>
+            </a:pPr>
+            <a:r>
+              <a:rPr lang="pt-BR" dirty="0"/>
+              <a:t>        </a:t>
+            </a:r>
+            <a:r>
+              <a:rPr lang="pt-BR" dirty="0" smtClean="0"/>
+              <a:t>}</a:t>
+            </a:r>
+          </a:p>
+          <a:p>
+            <a:pPr marL="0" indent="0">
+              <a:buNone/>
+            </a:pPr>
+            <a:r>
+              <a:rPr lang="pt-BR" dirty="0" smtClean="0"/>
+              <a:t>        </a:t>
+            </a:r>
+            <a:r>
+              <a:rPr lang="pt-BR" dirty="0" err="1" smtClean="0"/>
+              <a:t>em.close</a:t>
+            </a:r>
+            <a:r>
+              <a:rPr lang="pt-BR" dirty="0"/>
+              <a:t>();</a:t>
+            </a:r>
+          </a:p>
+          <a:p>
+            <a:pPr marL="0" indent="0">
+              <a:buNone/>
+            </a:pPr>
+            <a:r>
+              <a:rPr lang="pt-BR" dirty="0"/>
+              <a:t>        </a:t>
+            </a:r>
+            <a:r>
+              <a:rPr lang="pt-BR" dirty="0" err="1"/>
+              <a:t>emf.close</a:t>
+            </a:r>
+            <a:r>
+              <a:rPr lang="pt-BR" dirty="0"/>
+              <a:t>();</a:t>
+            </a:r>
+          </a:p>
+        </p:txBody>
+      </p:sp>
+    </p:spTree>
+    <p:extLst>
+      <p:ext uri="{BB962C8B-B14F-4D97-AF65-F5344CB8AC3E}">
+        <p14:creationId xmlns:p14="http://schemas.microsoft.com/office/powerpoint/2010/main" val="1410473383"/>
+      </p:ext>
+    </p:extLst>
+  </p:cSld>
+  <p:clrMapOvr>
+    <a:masterClrMapping/>
+  </p:clrMapOvr>
+</p:sld>
+</file>
+
+<file path=ppt/slides/slide38.xml><?xml version="1.0" encoding="utf-8"?>
 <p:sld xmlns:a="http://schemas.openxmlformats.org/drawingml/2006/main" xmlns:r="http://schemas.openxmlformats.org/officeDocument/2006/relationships" xmlns:p="http://schemas.openxmlformats.org/presentationml/2006/main">
   <p:cSld>
     <p:spTree>

</xml_diff>